<commit_message>
update slides and other few things
</commit_message>
<xml_diff>
--- a/K8s-basic.pptx
+++ b/K8s-basic.pptx
@@ -445,7 +445,7 @@
           <a:p>
             <a:fld id="{2772BE4E-48FD-A347-A676-3904A5044681}" type="datetimeFigureOut">
               <a:rPr lang="it-IT" smtClean="0"/>
-              <a:t>27/05/2020</a:t>
+              <a:t>29/05/2020</a:t>
             </a:fld>
             <a:endParaRPr lang="it-IT" dirty="0"/>
           </a:p>
@@ -1863,7 +1863,7 @@
           </a:ln>
           <a:extLst>
             <a:ext uri="{C572A759-6A51-4108-AA02-DFA0A04FC94B}">
-              <ma14:wrappingTextBoxFlag xmlns="" xmlns:ma14="http://schemas.microsoft.com/office/mac/drawingml/2011/main" val="1"/>
+              <ma14:wrappingTextBoxFlag xmlns:ma14="http://schemas.microsoft.com/office/mac/drawingml/2011/main" xmlns="" val="1"/>
             </a:ext>
           </a:extLst>
         </p:spPr>
@@ -2271,7 +2271,7 @@
           </a:ln>
           <a:extLst>
             <a:ext uri="{C572A759-6A51-4108-AA02-DFA0A04FC94B}">
-              <ma14:wrappingTextBoxFlag xmlns="" xmlns:ma14="http://schemas.microsoft.com/office/mac/drawingml/2011/main" val="1"/>
+              <ma14:wrappingTextBoxFlag xmlns:ma14="http://schemas.microsoft.com/office/mac/drawingml/2011/main" xmlns="" val="1"/>
             </a:ext>
           </a:extLst>
         </p:spPr>
@@ -2417,7 +2417,7 @@
           </a:ln>
           <a:extLst>
             <a:ext uri="{C572A759-6A51-4108-AA02-DFA0A04FC94B}">
-              <ma14:wrappingTextBoxFlag xmlns="" xmlns:ma14="http://schemas.microsoft.com/office/mac/drawingml/2011/main" val="1"/>
+              <ma14:wrappingTextBoxFlag xmlns:ma14="http://schemas.microsoft.com/office/mac/drawingml/2011/main" xmlns="" val="1"/>
             </a:ext>
           </a:extLst>
         </p:spPr>
@@ -3978,7 +3978,7 @@
           </a:ln>
           <a:extLst>
             <a:ext uri="{C572A759-6A51-4108-AA02-DFA0A04FC94B}">
-              <ma14:wrappingTextBoxFlag xmlns="" xmlns:ma14="http://schemas.microsoft.com/office/mac/drawingml/2011/main" val="1"/>
+              <ma14:wrappingTextBoxFlag xmlns:ma14="http://schemas.microsoft.com/office/mac/drawingml/2011/main" xmlns="" val="1"/>
             </a:ext>
           </a:extLst>
         </p:spPr>
@@ -4189,7 +4189,7 @@
           </a:ln>
           <a:extLst>
             <a:ext uri="{C572A759-6A51-4108-AA02-DFA0A04FC94B}">
-              <ma14:wrappingTextBoxFlag xmlns="" xmlns:ma14="http://schemas.microsoft.com/office/mac/drawingml/2011/main" val="1"/>
+              <ma14:wrappingTextBoxFlag xmlns:ma14="http://schemas.microsoft.com/office/mac/drawingml/2011/main" xmlns="" val="1"/>
             </a:ext>
           </a:extLst>
         </p:spPr>
@@ -4423,7 +4423,7 @@
           </a:ln>
           <a:extLst>
             <a:ext uri="{C572A759-6A51-4108-AA02-DFA0A04FC94B}">
-              <ma14:wrappingTextBoxFlag xmlns="" xmlns:ma14="http://schemas.microsoft.com/office/mac/drawingml/2011/main" val="1"/>
+              <ma14:wrappingTextBoxFlag xmlns:ma14="http://schemas.microsoft.com/office/mac/drawingml/2011/main" xmlns="" val="1"/>
             </a:ext>
           </a:extLst>
         </p:spPr>
@@ -4805,7 +4805,7 @@
           </a:ln>
           <a:extLst>
             <a:ext uri="{C572A759-6A51-4108-AA02-DFA0A04FC94B}">
-              <ma14:wrappingTextBoxFlag xmlns="" xmlns:ma14="http://schemas.microsoft.com/office/mac/drawingml/2011/main" val="1"/>
+              <ma14:wrappingTextBoxFlag xmlns:ma14="http://schemas.microsoft.com/office/mac/drawingml/2011/main" xmlns="" val="1"/>
             </a:ext>
           </a:extLst>
         </p:spPr>
@@ -6378,7 +6378,7 @@
           </a:ln>
           <a:extLst>
             <a:ext uri="{C572A759-6A51-4108-AA02-DFA0A04FC94B}">
-              <ma14:wrappingTextBoxFlag xmlns="" xmlns:ma14="http://schemas.microsoft.com/office/mac/drawingml/2011/main" val="1"/>
+              <ma14:wrappingTextBoxFlag xmlns:ma14="http://schemas.microsoft.com/office/mac/drawingml/2011/main" xmlns="" val="1"/>
             </a:ext>
           </a:extLst>
         </p:spPr>
@@ -6425,7 +6425,7 @@
           </a:ln>
           <a:extLst>
             <a:ext uri="{C572A759-6A51-4108-AA02-DFA0A04FC94B}">
-              <ma14:wrappingTextBoxFlag xmlns="" xmlns:ma14="http://schemas.microsoft.com/office/mac/drawingml/2011/main" val="1"/>
+              <ma14:wrappingTextBoxFlag xmlns:ma14="http://schemas.microsoft.com/office/mac/drawingml/2011/main" xmlns="" val="1"/>
             </a:ext>
           </a:extLst>
         </p:spPr>
@@ -6600,7 +6600,7 @@
           </a:ln>
           <a:extLst>
             <a:ext uri="{C572A759-6A51-4108-AA02-DFA0A04FC94B}">
-              <ma14:wrappingTextBoxFlag xmlns="" xmlns:ma14="http://schemas.microsoft.com/office/mac/drawingml/2011/main" val="1"/>
+              <ma14:wrappingTextBoxFlag xmlns:ma14="http://schemas.microsoft.com/office/mac/drawingml/2011/main" xmlns="" val="1"/>
             </a:ext>
           </a:extLst>
         </p:spPr>
@@ -6639,7 +6639,7 @@
           </a:ln>
           <a:extLst>
             <a:ext uri="{C572A759-6A51-4108-AA02-DFA0A04FC94B}">
-              <ma14:wrappingTextBoxFlag xmlns="" xmlns:ma14="http://schemas.microsoft.com/office/mac/drawingml/2011/main" val="1"/>
+              <ma14:wrappingTextBoxFlag xmlns:ma14="http://schemas.microsoft.com/office/mac/drawingml/2011/main" xmlns="" val="1"/>
             </a:ext>
           </a:extLst>
         </p:spPr>
@@ -7503,66 +7503,42 @@
           <a:chExt cx="0" cy="0"/>
         </a:xfrm>
       </p:grpSpPr>
-      <p:sp>
-        <p:nvSpPr>
-          <p:cNvPr id="237" name="Subtitle"/>
-          <p:cNvSpPr txBox="1">
-            <a:spLocks noGrp="1"/>
-          </p:cNvSpPr>
-          <p:nvPr>
-            <p:ph type="body" idx="13"/>
-          </p:nvPr>
-        </p:nvSpPr>
+      <p:pic>
+        <p:nvPicPr>
+          <p:cNvPr id="3" name="Picture 2" descr="A screen shot of a store&#10;&#10;Description automatically generated">
+            <a:extLst>
+              <a:ext uri="{FF2B5EF4-FFF2-40B4-BE49-F238E27FC236}">
+                <a16:creationId xmlns:a16="http://schemas.microsoft.com/office/drawing/2014/main" id="{DC995901-ADCD-400C-8784-74BD36EC832C}"/>
+              </a:ext>
+            </a:extLst>
+          </p:cNvPr>
+          <p:cNvPicPr>
+            <a:picLocks noChangeAspect="1"/>
+          </p:cNvPicPr>
+          <p:nvPr/>
+        </p:nvPicPr>
+        <p:blipFill>
+          <a:blip r:embed="rId3">
+            <a:extLst>
+              <a:ext uri="{28A0092B-C50C-407E-A947-70E740481C1C}">
+                <a14:useLocalDpi xmlns:a14="http://schemas.microsoft.com/office/drawing/2010/main" val="0"/>
+              </a:ext>
+            </a:extLst>
+          </a:blip>
+          <a:stretch>
+            <a:fillRect/>
+          </a:stretch>
+        </p:blipFill>
         <p:spPr>
           <a:xfrm>
-            <a:off x="414464" y="5097081"/>
-            <a:ext cx="9048952" cy="859274"/>
+            <a:off x="308740" y="1264596"/>
+            <a:ext cx="23190740" cy="11595370"/>
           </a:xfrm>
           <a:prstGeom prst="rect">
             <a:avLst/>
           </a:prstGeom>
         </p:spPr>
-        <p:txBody>
-          <a:bodyPr/>
-          <a:lstStyle/>
-          <a:p>
-            <a:r>
-              <a:rPr lang="en-US" dirty="0"/>
-              <a:t>Kubernetes (k8s) in action</a:t>
-            </a:r>
-          </a:p>
-        </p:txBody>
-      </p:sp>
-      <p:sp>
-        <p:nvSpPr>
-          <p:cNvPr id="238" name="www.deltatre.com"/>
-          <p:cNvSpPr txBox="1">
-            <a:spLocks noGrp="1"/>
-          </p:cNvSpPr>
-          <p:nvPr>
-            <p:ph type="body" idx="14"/>
-          </p:nvPr>
-        </p:nvSpPr>
-        <p:spPr>
-          <a:xfrm>
-            <a:off x="401675" y="6930281"/>
-            <a:ext cx="4025141" cy="561179"/>
-          </a:xfrm>
-          <a:prstGeom prst="rect">
-            <a:avLst/>
-          </a:prstGeom>
-        </p:spPr>
-        <p:txBody>
-          <a:bodyPr/>
-          <a:lstStyle/>
-          <a:p>
-            <a:r>
-              <a:rPr lang="en-US"/>
-              <a:t>www.deltatre.com</a:t>
-            </a:r>
-          </a:p>
-        </p:txBody>
-      </p:sp>
+      </p:pic>
     </p:spTree>
   </p:cSld>
   <p:clrMapOvr>
@@ -10080,7 +10056,7 @@
           </a:prstGeom>
           <a:extLst>
             <a:ext uri="{C572A759-6A51-4108-AA02-DFA0A04FC94B}">
-              <ma14:wrappingTextBoxFlag xmlns="" xmlns:ma14="http://schemas.microsoft.com/office/mac/drawingml/2011/main" val="1"/>
+              <ma14:wrappingTextBoxFlag xmlns:ma14="http://schemas.microsoft.com/office/mac/drawingml/2011/main" xmlns="" val="1"/>
             </a:ext>
           </a:extLst>
         </p:spPr>
@@ -10315,7 +10291,7 @@
           </a:ln>
           <a:extLst>
             <a:ext uri="{C572A759-6A51-4108-AA02-DFA0A04FC94B}">
-              <ma14:wrappingTextBoxFlag xmlns="" xmlns:ma14="http://schemas.microsoft.com/office/mac/drawingml/2011/main" val="1"/>
+              <ma14:wrappingTextBoxFlag xmlns:ma14="http://schemas.microsoft.com/office/mac/drawingml/2011/main" xmlns="" val="1"/>
             </a:ext>
           </a:extLst>
         </p:spPr>
@@ -12883,7 +12859,7 @@
           </a:prstGeom>
           <a:extLst>
             <a:ext uri="{C572A759-6A51-4108-AA02-DFA0A04FC94B}">
-              <ma14:wrappingTextBoxFlag xmlns="" xmlns:ma14="http://schemas.microsoft.com/office/mac/drawingml/2011/main" val="1"/>
+              <ma14:wrappingTextBoxFlag xmlns:ma14="http://schemas.microsoft.com/office/mac/drawingml/2011/main" xmlns="" val="1"/>
             </a:ext>
           </a:extLst>
         </p:spPr>
@@ -13073,7 +13049,7 @@
           </a:ln>
           <a:extLst>
             <a:ext uri="{C572A759-6A51-4108-AA02-DFA0A04FC94B}">
-              <ma14:wrappingTextBoxFlag xmlns="" xmlns:ma14="http://schemas.microsoft.com/office/mac/drawingml/2011/main" val="1"/>
+              <ma14:wrappingTextBoxFlag xmlns:ma14="http://schemas.microsoft.com/office/mac/drawingml/2011/main" xmlns="" val="1"/>
             </a:ext>
           </a:extLst>
         </p:spPr>
@@ -13356,7 +13332,7 @@
           </a:prstGeom>
           <a:extLst>
             <a:ext uri="{C572A759-6A51-4108-AA02-DFA0A04FC94B}">
-              <ma14:wrappingTextBoxFlag xmlns="" xmlns:ma14="http://schemas.microsoft.com/office/mac/drawingml/2011/main" val="1"/>
+              <ma14:wrappingTextBoxFlag xmlns:ma14="http://schemas.microsoft.com/office/mac/drawingml/2011/main" xmlns="" val="1"/>
             </a:ext>
           </a:extLst>
         </p:spPr>
@@ -13600,7 +13576,7 @@
           </a:ln>
           <a:extLst>
             <a:ext uri="{C572A759-6A51-4108-AA02-DFA0A04FC94B}">
-              <ma14:wrappingTextBoxFlag xmlns="" xmlns:ma14="http://schemas.microsoft.com/office/mac/drawingml/2011/main" val="1"/>
+              <ma14:wrappingTextBoxFlag xmlns:ma14="http://schemas.microsoft.com/office/mac/drawingml/2011/main" xmlns="" val="1"/>
             </a:ext>
           </a:extLst>
         </p:spPr>
@@ -13821,7 +13797,7 @@
           </a:prstGeom>
           <a:extLst>
             <a:ext uri="{C572A759-6A51-4108-AA02-DFA0A04FC94B}">
-              <ma14:wrappingTextBoxFlag xmlns="" xmlns:ma14="http://schemas.microsoft.com/office/mac/drawingml/2011/main" val="1"/>
+              <ma14:wrappingTextBoxFlag xmlns:ma14="http://schemas.microsoft.com/office/mac/drawingml/2011/main" xmlns="" val="1"/>
             </a:ext>
           </a:extLst>
         </p:spPr>
@@ -14072,7 +14048,7 @@
           </a:ln>
           <a:extLst>
             <a:ext uri="{C572A759-6A51-4108-AA02-DFA0A04FC94B}">
-              <ma14:wrappingTextBoxFlag xmlns="" xmlns:ma14="http://schemas.microsoft.com/office/mac/drawingml/2011/main" val="1"/>
+              <ma14:wrappingTextBoxFlag xmlns:ma14="http://schemas.microsoft.com/office/mac/drawingml/2011/main" xmlns="" val="1"/>
             </a:ext>
           </a:extLst>
         </p:spPr>
@@ -17118,21 +17094,6 @@
 </file>
 
 <file path=customXml/item1.xml><?xml version="1.0" encoding="utf-8"?>
-<p:properties xmlns:p="http://schemas.microsoft.com/office/2006/metadata/properties" xmlns:xsi="http://www.w3.org/2001/XMLSchema-instance" xmlns:pc="http://schemas.microsoft.com/office/infopath/2007/PartnerControls">
-  <documentManagement/>
-</p:properties>
-</file>
-
-<file path=customXml/item2.xml><?xml version="1.0" encoding="utf-8"?>
-<?mso-contentType ?>
-<FormTemplates xmlns="http://schemas.microsoft.com/sharepoint/v3/contenttype/forms">
-  <Display>DocumentLibraryForm</Display>
-  <Edit>DocumentLibraryForm</Edit>
-  <New>DocumentLibraryForm</New>
-</FormTemplates>
-</file>
-
-<file path=customXml/item3.xml><?xml version="1.0" encoding="utf-8"?>
 <ct:contentTypeSchema xmlns:ct="http://schemas.microsoft.com/office/2006/metadata/contentType" xmlns:ma="http://schemas.microsoft.com/office/2006/metadata/properties/metaAttributes" ct:_="" ma:_="" ma:contentTypeName="Documento" ma:contentTypeID="0x010100E6A5A58969A45D48A3FDE48C16D47668" ma:contentTypeVersion="7" ma:contentTypeDescription="Creare un nuovo documento." ma:contentTypeScope="" ma:versionID="6a156910bfe1709bd52a834455f674b1">
   <xsd:schema xmlns:xsd="http://www.w3.org/2001/XMLSchema" xmlns:xs="http://www.w3.org/2001/XMLSchema" xmlns:p="http://schemas.microsoft.com/office/2006/metadata/properties" xmlns:ns2="c3ffa819-a771-4877-ad4d-25f776e91fc1" xmlns:ns3="9fad99a4-1f10-4083-bdc6-95bb547585ec" targetNamespace="http://schemas.microsoft.com/office/2006/metadata/properties" ma:root="true" ma:fieldsID="dccc4f762faa72a8390d0658fd5f380b" ns2:_="" ns3:_="">
     <xsd:import namespace="c3ffa819-a771-4877-ad4d-25f776e91fc1"/>
@@ -17317,32 +17278,22 @@
 </ct:contentTypeSchema>
 </file>
 
-<file path=customXml/itemProps1.xml><?xml version="1.0" encoding="utf-8"?>
-<ds:datastoreItem xmlns:ds="http://schemas.openxmlformats.org/officeDocument/2006/customXml" ds:itemID="{37F187F3-04C2-4986-B925-C49BDDD739C4}">
-  <ds:schemaRefs>
-    <ds:schemaRef ds:uri="http://purl.org/dc/elements/1.1/"/>
-    <ds:schemaRef ds:uri="http://schemas.microsoft.com/office/2006/metadata/properties"/>
-    <ds:schemaRef ds:uri="c3ffa819-a771-4877-ad4d-25f776e91fc1"/>
-    <ds:schemaRef ds:uri="9fad99a4-1f10-4083-bdc6-95bb547585ec"/>
-    <ds:schemaRef ds:uri="http://purl.org/dc/terms/"/>
-    <ds:schemaRef ds:uri="http://schemas.microsoft.com/office/infopath/2007/PartnerControls"/>
-    <ds:schemaRef ds:uri="http://schemas.microsoft.com/office/2006/documentManagement/types"/>
-    <ds:schemaRef ds:uri="http://schemas.openxmlformats.org/package/2006/metadata/core-properties"/>
-    <ds:schemaRef ds:uri="http://www.w3.org/XML/1998/namespace"/>
-    <ds:schemaRef ds:uri="http://purl.org/dc/dcmitype/"/>
-  </ds:schemaRefs>
-</ds:datastoreItem>
+<file path=customXml/item2.xml><?xml version="1.0" encoding="utf-8"?>
+<?mso-contentType ?>
+<FormTemplates xmlns="http://schemas.microsoft.com/sharepoint/v3/contenttype/forms">
+  <Display>DocumentLibraryForm</Display>
+  <Edit>DocumentLibraryForm</Edit>
+  <New>DocumentLibraryForm</New>
+</FormTemplates>
 </file>
 
-<file path=customXml/itemProps2.xml><?xml version="1.0" encoding="utf-8"?>
-<ds:datastoreItem xmlns:ds="http://schemas.openxmlformats.org/officeDocument/2006/customXml" ds:itemID="{81BFDE8D-C4DF-4F86-84B9-52E0C5AFDCD4}">
-  <ds:schemaRefs>
-    <ds:schemaRef ds:uri="http://schemas.microsoft.com/sharepoint/v3/contenttype/forms"/>
-  </ds:schemaRefs>
-</ds:datastoreItem>
+<file path=customXml/item3.xml><?xml version="1.0" encoding="utf-8"?>
+<p:properties xmlns:p="http://schemas.microsoft.com/office/2006/metadata/properties" xmlns:xsi="http://www.w3.org/2001/XMLSchema-instance" xmlns:pc="http://schemas.microsoft.com/office/infopath/2007/PartnerControls">
+  <documentManagement/>
+</p:properties>
 </file>
 
-<file path=customXml/itemProps3.xml><?xml version="1.0" encoding="utf-8"?>
+<file path=customXml/itemProps1.xml><?xml version="1.0" encoding="utf-8"?>
 <ds:datastoreItem xmlns:ds="http://schemas.openxmlformats.org/officeDocument/2006/customXml" ds:itemID="{7F298B02-FB17-484A-BB72-42168D5F181C}">
   <ds:schemaRefs>
     <ds:schemaRef ds:uri="http://schemas.microsoft.com/office/2006/metadata/contentType"/>
@@ -17359,4 +17310,29 @@
     <ds:schemaRef ds:uri="http://schemas.microsoft.com/internal/obd"/>
   </ds:schemaRefs>
 </ds:datastoreItem>
+</file>
+
+<file path=customXml/itemProps2.xml><?xml version="1.0" encoding="utf-8"?>
+<ds:datastoreItem xmlns:ds="http://schemas.openxmlformats.org/officeDocument/2006/customXml" ds:itemID="{81BFDE8D-C4DF-4F86-84B9-52E0C5AFDCD4}">
+  <ds:schemaRefs>
+    <ds:schemaRef ds:uri="http://schemas.microsoft.com/sharepoint/v3/contenttype/forms"/>
+  </ds:schemaRefs>
+</ds:datastoreItem>
+</file>
+
+<file path=customXml/itemProps3.xml><?xml version="1.0" encoding="utf-8"?>
+<ds:datastoreItem xmlns:ds="http://schemas.openxmlformats.org/officeDocument/2006/customXml" ds:itemID="{37F187F3-04C2-4986-B925-C49BDDD739C4}">
+  <ds:schemaRefs>
+    <ds:schemaRef ds:uri="http://purl.org/dc/elements/1.1/"/>
+    <ds:schemaRef ds:uri="http://schemas.microsoft.com/office/2006/metadata/properties"/>
+    <ds:schemaRef ds:uri="c3ffa819-a771-4877-ad4d-25f776e91fc1"/>
+    <ds:schemaRef ds:uri="9fad99a4-1f10-4083-bdc6-95bb547585ec"/>
+    <ds:schemaRef ds:uri="http://purl.org/dc/terms/"/>
+    <ds:schemaRef ds:uri="http://schemas.microsoft.com/office/infopath/2007/PartnerControls"/>
+    <ds:schemaRef ds:uri="http://schemas.microsoft.com/office/2006/documentManagement/types"/>
+    <ds:schemaRef ds:uri="http://schemas.openxmlformats.org/package/2006/metadata/core-properties"/>
+    <ds:schemaRef ds:uri="http://www.w3.org/XML/1998/namespace"/>
+    <ds:schemaRef ds:uri="http://purl.org/dc/dcmitype/"/>
+  </ds:schemaRefs>
+</ds:datastoreItem>
 </file>
</xml_diff>

<commit_message>
kind on port 8080.. added kubectl exec command and copy files
</commit_message>
<xml_diff>
--- a/K8s-basic.pptx
+++ b/K8s-basic.pptx
@@ -445,7 +445,7 @@
           <a:p>
             <a:fld id="{2772BE4E-48FD-A347-A676-3904A5044681}" type="datetimeFigureOut">
               <a:rPr lang="it-IT" smtClean="0"/>
-              <a:t>30/05/2020</a:t>
+              <a:t>02/06/2020</a:t>
             </a:fld>
             <a:endParaRPr lang="it-IT" dirty="0"/>
           </a:p>
@@ -1863,7 +1863,7 @@
           </a:ln>
           <a:extLst>
             <a:ext uri="{C572A759-6A51-4108-AA02-DFA0A04FC94B}">
-              <ma14:wrappingTextBoxFlag xmlns:ma14="http://schemas.microsoft.com/office/mac/drawingml/2011/main" xmlns="" val="1"/>
+              <ma14:wrappingTextBoxFlag xmlns="" xmlns:ma14="http://schemas.microsoft.com/office/mac/drawingml/2011/main" val="1"/>
             </a:ext>
           </a:extLst>
         </p:spPr>
@@ -2271,7 +2271,7 @@
           </a:ln>
           <a:extLst>
             <a:ext uri="{C572A759-6A51-4108-AA02-DFA0A04FC94B}">
-              <ma14:wrappingTextBoxFlag xmlns:ma14="http://schemas.microsoft.com/office/mac/drawingml/2011/main" xmlns="" val="1"/>
+              <ma14:wrappingTextBoxFlag xmlns="" xmlns:ma14="http://schemas.microsoft.com/office/mac/drawingml/2011/main" val="1"/>
             </a:ext>
           </a:extLst>
         </p:spPr>
@@ -2417,7 +2417,7 @@
           </a:ln>
           <a:extLst>
             <a:ext uri="{C572A759-6A51-4108-AA02-DFA0A04FC94B}">
-              <ma14:wrappingTextBoxFlag xmlns:ma14="http://schemas.microsoft.com/office/mac/drawingml/2011/main" xmlns="" val="1"/>
+              <ma14:wrappingTextBoxFlag xmlns="" xmlns:ma14="http://schemas.microsoft.com/office/mac/drawingml/2011/main" val="1"/>
             </a:ext>
           </a:extLst>
         </p:spPr>
@@ -3978,7 +3978,7 @@
           </a:ln>
           <a:extLst>
             <a:ext uri="{C572A759-6A51-4108-AA02-DFA0A04FC94B}">
-              <ma14:wrappingTextBoxFlag xmlns:ma14="http://schemas.microsoft.com/office/mac/drawingml/2011/main" xmlns="" val="1"/>
+              <ma14:wrappingTextBoxFlag xmlns="" xmlns:ma14="http://schemas.microsoft.com/office/mac/drawingml/2011/main" val="1"/>
             </a:ext>
           </a:extLst>
         </p:spPr>
@@ -4189,7 +4189,7 @@
           </a:ln>
           <a:extLst>
             <a:ext uri="{C572A759-6A51-4108-AA02-DFA0A04FC94B}">
-              <ma14:wrappingTextBoxFlag xmlns:ma14="http://schemas.microsoft.com/office/mac/drawingml/2011/main" xmlns="" val="1"/>
+              <ma14:wrappingTextBoxFlag xmlns="" xmlns:ma14="http://schemas.microsoft.com/office/mac/drawingml/2011/main" val="1"/>
             </a:ext>
           </a:extLst>
         </p:spPr>
@@ -4423,7 +4423,7 @@
           </a:ln>
           <a:extLst>
             <a:ext uri="{C572A759-6A51-4108-AA02-DFA0A04FC94B}">
-              <ma14:wrappingTextBoxFlag xmlns:ma14="http://schemas.microsoft.com/office/mac/drawingml/2011/main" xmlns="" val="1"/>
+              <ma14:wrappingTextBoxFlag xmlns="" xmlns:ma14="http://schemas.microsoft.com/office/mac/drawingml/2011/main" val="1"/>
             </a:ext>
           </a:extLst>
         </p:spPr>
@@ -4805,7 +4805,7 @@
           </a:ln>
           <a:extLst>
             <a:ext uri="{C572A759-6A51-4108-AA02-DFA0A04FC94B}">
-              <ma14:wrappingTextBoxFlag xmlns:ma14="http://schemas.microsoft.com/office/mac/drawingml/2011/main" xmlns="" val="1"/>
+              <ma14:wrappingTextBoxFlag xmlns="" xmlns:ma14="http://schemas.microsoft.com/office/mac/drawingml/2011/main" val="1"/>
             </a:ext>
           </a:extLst>
         </p:spPr>
@@ -6378,7 +6378,7 @@
           </a:ln>
           <a:extLst>
             <a:ext uri="{C572A759-6A51-4108-AA02-DFA0A04FC94B}">
-              <ma14:wrappingTextBoxFlag xmlns:ma14="http://schemas.microsoft.com/office/mac/drawingml/2011/main" xmlns="" val="1"/>
+              <ma14:wrappingTextBoxFlag xmlns="" xmlns:ma14="http://schemas.microsoft.com/office/mac/drawingml/2011/main" val="1"/>
             </a:ext>
           </a:extLst>
         </p:spPr>
@@ -6425,7 +6425,7 @@
           </a:ln>
           <a:extLst>
             <a:ext uri="{C572A759-6A51-4108-AA02-DFA0A04FC94B}">
-              <ma14:wrappingTextBoxFlag xmlns:ma14="http://schemas.microsoft.com/office/mac/drawingml/2011/main" xmlns="" val="1"/>
+              <ma14:wrappingTextBoxFlag xmlns="" xmlns:ma14="http://schemas.microsoft.com/office/mac/drawingml/2011/main" val="1"/>
             </a:ext>
           </a:extLst>
         </p:spPr>
@@ -6600,7 +6600,7 @@
           </a:ln>
           <a:extLst>
             <a:ext uri="{C572A759-6A51-4108-AA02-DFA0A04FC94B}">
-              <ma14:wrappingTextBoxFlag xmlns:ma14="http://schemas.microsoft.com/office/mac/drawingml/2011/main" xmlns="" val="1"/>
+              <ma14:wrappingTextBoxFlag xmlns="" xmlns:ma14="http://schemas.microsoft.com/office/mac/drawingml/2011/main" val="1"/>
             </a:ext>
           </a:extLst>
         </p:spPr>
@@ -6639,7 +6639,7 @@
           </a:ln>
           <a:extLst>
             <a:ext uri="{C572A759-6A51-4108-AA02-DFA0A04FC94B}">
-              <ma14:wrappingTextBoxFlag xmlns:ma14="http://schemas.microsoft.com/office/mac/drawingml/2011/main" xmlns="" val="1"/>
+              <ma14:wrappingTextBoxFlag xmlns="" xmlns:ma14="http://schemas.microsoft.com/office/mac/drawingml/2011/main" val="1"/>
             </a:ext>
           </a:extLst>
         </p:spPr>
@@ -8532,15 +8532,7 @@
           <a:p>
             <a:r>
               <a:rPr lang="en-US" dirty="0"/>
-              <a:t>Log into a pod: </a:t>
-            </a:r>
-            <a:r>
-              <a:rPr lang="en-US" dirty="0" err="1"/>
-              <a:t>kubectl</a:t>
-            </a:r>
-            <a:r>
-              <a:rPr lang="en-US" dirty="0"/>
-              <a:t> exec -n &lt;namespace&gt; -it &lt;</a:t>
+              <a:t>Run command in container kubectl exec &lt;</a:t>
             </a:r>
             <a:r>
               <a:rPr lang="en-US" dirty="0" err="1"/>
@@ -8548,21 +8540,48 @@
             </a:r>
             <a:r>
               <a:rPr lang="en-US" dirty="0"/>
+              <a:t>&gt; -n &lt;namespace&gt; -- &lt;command&gt;</a:t>
+            </a:r>
+          </a:p>
+          <a:p>
+            <a:r>
+              <a:rPr lang="en-US" dirty="0"/>
+              <a:t>Log into a pod: kubectl exec -n &lt;namespace&gt; -it &lt;</a:t>
+            </a:r>
+            <a:r>
+              <a:rPr lang="en-US" dirty="0" err="1"/>
+              <a:t>podname</a:t>
+            </a:r>
+            <a:r>
+              <a:rPr lang="en-US" dirty="0"/>
               <a:t>&gt; -- /bin/bash (if bash installed in the image)</a:t>
             </a:r>
           </a:p>
           <a:p>
             <a:r>
               <a:rPr lang="en-US" dirty="0"/>
-              <a:t>Watch pod logs in streaming mode: </a:t>
+              <a:t>Copy files from pod to local (and vice versa)</a:t>
+            </a:r>
+          </a:p>
+          <a:p>
+            <a:pPr lvl="1"/>
+            <a:r>
+              <a:rPr lang="en-US" dirty="0"/>
+              <a:t>kubectl cp &lt;namespace&gt;/&lt;</a:t>
             </a:r>
             <a:r>
               <a:rPr lang="en-US" dirty="0" err="1"/>
-              <a:t>kubectl</a:t>
-            </a:r>
-            <a:r>
-              <a:rPr lang="en-US" dirty="0"/>
-              <a:t> logs -f &lt;</a:t>
+              <a:t>podname</a:t>
+            </a:r>
+            <a:r>
+              <a:rPr lang="en-US" dirty="0"/>
+              <a:t>&gt;:/app ./app</a:t>
+            </a:r>
+          </a:p>
+          <a:p>
+            <a:r>
+              <a:rPr lang="en-US" dirty="0"/>
+              <a:t>Watch pod logs in streaming mode: kubectl logs -f &lt;</a:t>
             </a:r>
             <a:r>
               <a:rPr lang="en-US" dirty="0" err="1"/>
@@ -10121,7 +10140,7 @@
           </a:prstGeom>
           <a:extLst>
             <a:ext uri="{C572A759-6A51-4108-AA02-DFA0A04FC94B}">
-              <ma14:wrappingTextBoxFlag xmlns:ma14="http://schemas.microsoft.com/office/mac/drawingml/2011/main" xmlns="" val="1"/>
+              <ma14:wrappingTextBoxFlag xmlns="" xmlns:ma14="http://schemas.microsoft.com/office/mac/drawingml/2011/main" val="1"/>
             </a:ext>
           </a:extLst>
         </p:spPr>
@@ -10356,7 +10375,7 @@
           </a:ln>
           <a:extLst>
             <a:ext uri="{C572A759-6A51-4108-AA02-DFA0A04FC94B}">
-              <ma14:wrappingTextBoxFlag xmlns:ma14="http://schemas.microsoft.com/office/mac/drawingml/2011/main" xmlns="" val="1"/>
+              <ma14:wrappingTextBoxFlag xmlns="" xmlns:ma14="http://schemas.microsoft.com/office/mac/drawingml/2011/main" val="1"/>
             </a:ext>
           </a:extLst>
         </p:spPr>
@@ -12924,7 +12943,7 @@
           </a:prstGeom>
           <a:extLst>
             <a:ext uri="{C572A759-6A51-4108-AA02-DFA0A04FC94B}">
-              <ma14:wrappingTextBoxFlag xmlns:ma14="http://schemas.microsoft.com/office/mac/drawingml/2011/main" xmlns="" val="1"/>
+              <ma14:wrappingTextBoxFlag xmlns="" xmlns:ma14="http://schemas.microsoft.com/office/mac/drawingml/2011/main" val="1"/>
             </a:ext>
           </a:extLst>
         </p:spPr>
@@ -13131,7 +13150,7 @@
           </a:ln>
           <a:extLst>
             <a:ext uri="{C572A759-6A51-4108-AA02-DFA0A04FC94B}">
-              <ma14:wrappingTextBoxFlag xmlns:ma14="http://schemas.microsoft.com/office/mac/drawingml/2011/main" xmlns="" val="1"/>
+              <ma14:wrappingTextBoxFlag xmlns="" xmlns:ma14="http://schemas.microsoft.com/office/mac/drawingml/2011/main" val="1"/>
             </a:ext>
           </a:extLst>
         </p:spPr>
@@ -13613,7 +13632,7 @@
           </a:prstGeom>
           <a:extLst>
             <a:ext uri="{C572A759-6A51-4108-AA02-DFA0A04FC94B}">
-              <ma14:wrappingTextBoxFlag xmlns:ma14="http://schemas.microsoft.com/office/mac/drawingml/2011/main" xmlns="" val="1"/>
+              <ma14:wrappingTextBoxFlag xmlns="" xmlns:ma14="http://schemas.microsoft.com/office/mac/drawingml/2011/main" val="1"/>
             </a:ext>
           </a:extLst>
         </p:spPr>
@@ -13857,7 +13876,7 @@
           </a:ln>
           <a:extLst>
             <a:ext uri="{C572A759-6A51-4108-AA02-DFA0A04FC94B}">
-              <ma14:wrappingTextBoxFlag xmlns:ma14="http://schemas.microsoft.com/office/mac/drawingml/2011/main" xmlns="" val="1"/>
+              <ma14:wrappingTextBoxFlag xmlns="" xmlns:ma14="http://schemas.microsoft.com/office/mac/drawingml/2011/main" val="1"/>
             </a:ext>
           </a:extLst>
         </p:spPr>
@@ -14078,7 +14097,7 @@
           </a:prstGeom>
           <a:extLst>
             <a:ext uri="{C572A759-6A51-4108-AA02-DFA0A04FC94B}">
-              <ma14:wrappingTextBoxFlag xmlns:ma14="http://schemas.microsoft.com/office/mac/drawingml/2011/main" xmlns="" val="1"/>
+              <ma14:wrappingTextBoxFlag xmlns="" xmlns:ma14="http://schemas.microsoft.com/office/mac/drawingml/2011/main" val="1"/>
             </a:ext>
           </a:extLst>
         </p:spPr>
@@ -14321,7 +14340,7 @@
           </a:ln>
           <a:extLst>
             <a:ext uri="{C572A759-6A51-4108-AA02-DFA0A04FC94B}">
-              <ma14:wrappingTextBoxFlag xmlns:ma14="http://schemas.microsoft.com/office/mac/drawingml/2011/main" xmlns="" val="1"/>
+              <ma14:wrappingTextBoxFlag xmlns="" xmlns:ma14="http://schemas.microsoft.com/office/mac/drawingml/2011/main" val="1"/>
             </a:ext>
           </a:extLst>
         </p:spPr>
@@ -17099,6 +17118,21 @@
 </file>
 
 <file path=customXml/item1.xml><?xml version="1.0" encoding="utf-8"?>
+<p:properties xmlns:p="http://schemas.microsoft.com/office/2006/metadata/properties" xmlns:xsi="http://www.w3.org/2001/XMLSchema-instance" xmlns:pc="http://schemas.microsoft.com/office/infopath/2007/PartnerControls">
+  <documentManagement/>
+</p:properties>
+</file>
+
+<file path=customXml/item2.xml><?xml version="1.0" encoding="utf-8"?>
+<?mso-contentType ?>
+<FormTemplates xmlns="http://schemas.microsoft.com/sharepoint/v3/contenttype/forms">
+  <Display>DocumentLibraryForm</Display>
+  <Edit>DocumentLibraryForm</Edit>
+  <New>DocumentLibraryForm</New>
+</FormTemplates>
+</file>
+
+<file path=customXml/item3.xml><?xml version="1.0" encoding="utf-8"?>
 <ct:contentTypeSchema xmlns:ct="http://schemas.microsoft.com/office/2006/metadata/contentType" xmlns:ma="http://schemas.microsoft.com/office/2006/metadata/properties/metaAttributes" ct:_="" ma:_="" ma:contentTypeName="Documento" ma:contentTypeID="0x010100E6A5A58969A45D48A3FDE48C16D47668" ma:contentTypeVersion="7" ma:contentTypeDescription="Creare un nuovo documento." ma:contentTypeScope="" ma:versionID="6a156910bfe1709bd52a834455f674b1">
   <xsd:schema xmlns:xsd="http://www.w3.org/2001/XMLSchema" xmlns:xs="http://www.w3.org/2001/XMLSchema" xmlns:p="http://schemas.microsoft.com/office/2006/metadata/properties" xmlns:ns2="c3ffa819-a771-4877-ad4d-25f776e91fc1" xmlns:ns3="9fad99a4-1f10-4083-bdc6-95bb547585ec" targetNamespace="http://schemas.microsoft.com/office/2006/metadata/properties" ma:root="true" ma:fieldsID="dccc4f762faa72a8390d0658fd5f380b" ns2:_="" ns3:_="">
     <xsd:import namespace="c3ffa819-a771-4877-ad4d-25f776e91fc1"/>
@@ -17283,22 +17317,32 @@
 </ct:contentTypeSchema>
 </file>
 
-<file path=customXml/item2.xml><?xml version="1.0" encoding="utf-8"?>
-<?mso-contentType ?>
-<FormTemplates xmlns="http://schemas.microsoft.com/sharepoint/v3/contenttype/forms">
-  <Display>DocumentLibraryForm</Display>
-  <Edit>DocumentLibraryForm</Edit>
-  <New>DocumentLibraryForm</New>
-</FormTemplates>
+<file path=customXml/itemProps1.xml><?xml version="1.0" encoding="utf-8"?>
+<ds:datastoreItem xmlns:ds="http://schemas.openxmlformats.org/officeDocument/2006/customXml" ds:itemID="{37F187F3-04C2-4986-B925-C49BDDD739C4}">
+  <ds:schemaRefs>
+    <ds:schemaRef ds:uri="http://purl.org/dc/elements/1.1/"/>
+    <ds:schemaRef ds:uri="http://schemas.microsoft.com/office/2006/metadata/properties"/>
+    <ds:schemaRef ds:uri="c3ffa819-a771-4877-ad4d-25f776e91fc1"/>
+    <ds:schemaRef ds:uri="9fad99a4-1f10-4083-bdc6-95bb547585ec"/>
+    <ds:schemaRef ds:uri="http://purl.org/dc/terms/"/>
+    <ds:schemaRef ds:uri="http://schemas.microsoft.com/office/infopath/2007/PartnerControls"/>
+    <ds:schemaRef ds:uri="http://schemas.microsoft.com/office/2006/documentManagement/types"/>
+    <ds:schemaRef ds:uri="http://schemas.openxmlformats.org/package/2006/metadata/core-properties"/>
+    <ds:schemaRef ds:uri="http://www.w3.org/XML/1998/namespace"/>
+    <ds:schemaRef ds:uri="http://purl.org/dc/dcmitype/"/>
+  </ds:schemaRefs>
+</ds:datastoreItem>
 </file>
 
-<file path=customXml/item3.xml><?xml version="1.0" encoding="utf-8"?>
-<p:properties xmlns:p="http://schemas.microsoft.com/office/2006/metadata/properties" xmlns:xsi="http://www.w3.org/2001/XMLSchema-instance" xmlns:pc="http://schemas.microsoft.com/office/infopath/2007/PartnerControls">
-  <documentManagement/>
-</p:properties>
+<file path=customXml/itemProps2.xml><?xml version="1.0" encoding="utf-8"?>
+<ds:datastoreItem xmlns:ds="http://schemas.openxmlformats.org/officeDocument/2006/customXml" ds:itemID="{81BFDE8D-C4DF-4F86-84B9-52E0C5AFDCD4}">
+  <ds:schemaRefs>
+    <ds:schemaRef ds:uri="http://schemas.microsoft.com/sharepoint/v3/contenttype/forms"/>
+  </ds:schemaRefs>
+</ds:datastoreItem>
 </file>
 
-<file path=customXml/itemProps1.xml><?xml version="1.0" encoding="utf-8"?>
+<file path=customXml/itemProps3.xml><?xml version="1.0" encoding="utf-8"?>
 <ds:datastoreItem xmlns:ds="http://schemas.openxmlformats.org/officeDocument/2006/customXml" ds:itemID="{7F298B02-FB17-484A-BB72-42168D5F181C}">
   <ds:schemaRefs>
     <ds:schemaRef ds:uri="http://schemas.microsoft.com/office/2006/metadata/contentType"/>
@@ -17315,29 +17359,4 @@
     <ds:schemaRef ds:uri="http://schemas.microsoft.com/internal/obd"/>
   </ds:schemaRefs>
 </ds:datastoreItem>
-</file>
-
-<file path=customXml/itemProps2.xml><?xml version="1.0" encoding="utf-8"?>
-<ds:datastoreItem xmlns:ds="http://schemas.openxmlformats.org/officeDocument/2006/customXml" ds:itemID="{81BFDE8D-C4DF-4F86-84B9-52E0C5AFDCD4}">
-  <ds:schemaRefs>
-    <ds:schemaRef ds:uri="http://schemas.microsoft.com/sharepoint/v3/contenttype/forms"/>
-  </ds:schemaRefs>
-</ds:datastoreItem>
-</file>
-
-<file path=customXml/itemProps3.xml><?xml version="1.0" encoding="utf-8"?>
-<ds:datastoreItem xmlns:ds="http://schemas.openxmlformats.org/officeDocument/2006/customXml" ds:itemID="{37F187F3-04C2-4986-B925-C49BDDD739C4}">
-  <ds:schemaRefs>
-    <ds:schemaRef ds:uri="http://purl.org/dc/elements/1.1/"/>
-    <ds:schemaRef ds:uri="http://schemas.microsoft.com/office/2006/metadata/properties"/>
-    <ds:schemaRef ds:uri="c3ffa819-a771-4877-ad4d-25f776e91fc1"/>
-    <ds:schemaRef ds:uri="9fad99a4-1f10-4083-bdc6-95bb547585ec"/>
-    <ds:schemaRef ds:uri="http://purl.org/dc/terms/"/>
-    <ds:schemaRef ds:uri="http://schemas.microsoft.com/office/infopath/2007/PartnerControls"/>
-    <ds:schemaRef ds:uri="http://schemas.microsoft.com/office/2006/documentManagement/types"/>
-    <ds:schemaRef ds:uri="http://schemas.openxmlformats.org/package/2006/metadata/core-properties"/>
-    <ds:schemaRef ds:uri="http://www.w3.org/XML/1998/namespace"/>
-    <ds:schemaRef ds:uri="http://purl.org/dc/dcmitype/"/>
-  </ds:schemaRefs>
-</ds:datastoreItem>
 </file>
</xml_diff>